<commit_message>
ПО Xamarin DIR added
</commit_message>
<xml_diff>
--- a/Course III/БД/1C/Курсовой/Презентация.pptx
+++ b/Course III/БД/1C/Курсовой/Презентация.pptx
@@ -284,7 +284,7 @@
           <a:p>
             <a:fld id="{24CE221E-83ED-4F6C-BA5F-3F9E6FDB6953}" type="datetimeFigureOut">
               <a:rPr lang="ru-RU" smtClean="0"/>
-              <a:t>29.05.2018</a:t>
+              <a:t>01.06.2018</a:t>
             </a:fld>
             <a:endParaRPr lang="ru-RU" dirty="0"/>
           </a:p>
@@ -449,7 +449,7 @@
           <a:p>
             <a:fld id="{97853E5F-CE67-483C-A264-F17AC70E9CA2}" type="datetimeFigureOut">
               <a:rPr lang="ru-RU" smtClean="0"/>
-              <a:t>29.05.2018</a:t>
+              <a:t>01.06.2018</a:t>
             </a:fld>
             <a:endParaRPr lang="ru-RU" dirty="0"/>
           </a:p>
@@ -884,7 +884,7 @@
           <a:p>
             <a:fld id="{3E0FA9E5-6744-4841-888F-9E7CC0C2B7EC}" type="datetimeFigureOut">
               <a:rPr lang="ru-RU" smtClean="0"/>
-              <a:t>29.05.2018</a:t>
+              <a:t>01.06.2018</a:t>
             </a:fld>
             <a:endParaRPr lang="ru-RU" dirty="0"/>
           </a:p>
@@ -1120,7 +1120,7 @@
             <a:fld id="{3E0FA9E5-6744-4841-888F-9E7CC0C2B7EC}" type="datetimeFigureOut">
               <a:rPr lang="ru-RU" smtClean="0"/>
               <a:pPr/>
-              <a:t>29.05.2018</a:t>
+              <a:t>01.06.2018</a:t>
             </a:fld>
             <a:endParaRPr lang="ru-RU" dirty="0"/>
           </a:p>
@@ -1297,7 +1297,7 @@
             <a:fld id="{3E0FA9E5-6744-4841-888F-9E7CC0C2B7EC}" type="datetimeFigureOut">
               <a:rPr lang="ru-RU" smtClean="0"/>
               <a:pPr/>
-              <a:t>29.05.2018</a:t>
+              <a:t>01.06.2018</a:t>
             </a:fld>
             <a:endParaRPr lang="ru-RU" dirty="0"/>
           </a:p>
@@ -1463,7 +1463,7 @@
           <a:p>
             <a:fld id="{3E0FA9E5-6744-4841-888F-9E7CC0C2B7EC}" type="datetimeFigureOut">
               <a:rPr lang="ru-RU" smtClean="0"/>
-              <a:t>29.05.2018</a:t>
+              <a:t>01.06.2018</a:t>
             </a:fld>
             <a:endParaRPr lang="ru-RU" dirty="0"/>
           </a:p>
@@ -1724,7 +1724,7 @@
           <a:p>
             <a:fld id="{3E0FA9E5-6744-4841-888F-9E7CC0C2B7EC}" type="datetimeFigureOut">
               <a:rPr lang="ru-RU" smtClean="0"/>
-              <a:t>29.05.2018</a:t>
+              <a:t>01.06.2018</a:t>
             </a:fld>
             <a:endParaRPr lang="ru-RU" dirty="0"/>
           </a:p>
@@ -2057,7 +2057,7 @@
           <a:p>
             <a:fld id="{3E0FA9E5-6744-4841-888F-9E7CC0C2B7EC}" type="datetimeFigureOut">
               <a:rPr lang="ru-RU" smtClean="0"/>
-              <a:t>29.05.2018</a:t>
+              <a:t>01.06.2018</a:t>
             </a:fld>
             <a:endParaRPr lang="ru-RU" dirty="0"/>
           </a:p>
@@ -2515,7 +2515,7 @@
           <a:p>
             <a:fld id="{3E0FA9E5-6744-4841-888F-9E7CC0C2B7EC}" type="datetimeFigureOut">
               <a:rPr lang="ru-RU" smtClean="0"/>
-              <a:t>29.05.2018</a:t>
+              <a:t>01.06.2018</a:t>
             </a:fld>
             <a:endParaRPr lang="ru-RU" dirty="0"/>
           </a:p>
@@ -2640,7 +2640,7 @@
           <a:p>
             <a:fld id="{3E0FA9E5-6744-4841-888F-9E7CC0C2B7EC}" type="datetimeFigureOut">
               <a:rPr lang="ru-RU" smtClean="0"/>
-              <a:t>29.05.2018</a:t>
+              <a:t>01.06.2018</a:t>
             </a:fld>
             <a:endParaRPr lang="ru-RU" dirty="0"/>
           </a:p>
@@ -2742,7 +2742,7 @@
           <a:p>
             <a:fld id="{3E0FA9E5-6744-4841-888F-9E7CC0C2B7EC}" type="datetimeFigureOut">
               <a:rPr lang="ru-RU" smtClean="0"/>
-              <a:t>29.05.2018</a:t>
+              <a:t>01.06.2018</a:t>
             </a:fld>
             <a:endParaRPr lang="ru-RU" dirty="0"/>
           </a:p>
@@ -3036,7 +3036,7 @@
           <a:p>
             <a:fld id="{3E0FA9E5-6744-4841-888F-9E7CC0C2B7EC}" type="datetimeFigureOut">
               <a:rPr lang="ru-RU" smtClean="0"/>
-              <a:t>29.05.2018</a:t>
+              <a:t>01.06.2018</a:t>
             </a:fld>
             <a:endParaRPr lang="ru-RU" dirty="0"/>
           </a:p>
@@ -3365,7 +3365,7 @@
           <a:p>
             <a:fld id="{0393231C-9702-6447-A881-5A9BAA4CB57E}" type="datetimeFigureOut">
               <a:rPr lang="ru-RU" smtClean="0"/>
-              <a:t>29.05.2018</a:t>
+              <a:t>01.06.2018</a:t>
             </a:fld>
             <a:endParaRPr lang="ru-RU"/>
           </a:p>
@@ -3627,7 +3627,7 @@
             <a:fld id="{3E0FA9E5-6744-4841-888F-9E7CC0C2B7EC}" type="datetimeFigureOut">
               <a:rPr lang="ru-RU" smtClean="0"/>
               <a:pPr/>
-              <a:t>29.05.2018</a:t>
+              <a:t>01.06.2018</a:t>
             </a:fld>
             <a:endParaRPr lang="ru-RU" dirty="0"/>
           </a:p>
@@ -5642,21 +5642,7 @@
                 <a:latin typeface="Helvetica"/>
                 <a:cs typeface="Helvetica"/>
               </a:rPr>
-              <a:t>Целью курсового проекта является разработка автоматизированной системы для работы приемной комиссии колледжа</a:t>
-            </a:r>
-            <a:r>
-              <a:rPr lang="en-US" sz="2500" dirty="0">
-                <a:latin typeface="Helvetica"/>
-                <a:cs typeface="Helvetica"/>
-              </a:rPr>
-              <a:t> </a:t>
-            </a:r>
-            <a:r>
-              <a:rPr lang="ru-RU" sz="2500" dirty="0">
-                <a:latin typeface="Helvetica"/>
-                <a:cs typeface="Helvetica"/>
-              </a:rPr>
-              <a:t>для получения получение данных об абитуриентах колледжа и их последующего преобразования и формирования отчетов посредством системы 1С</a:t>
+              <a:t>Целью курсового проекта является разработка автоматизированной системы для работы приемной комиссии для получения данных об абитуриентах колледжа и их последующего преобразования и формирования отчетов посредством системы 1С</a:t>
             </a:r>
             <a:r>
               <a:rPr lang="en-US" sz="2500" dirty="0">

</xml_diff>